<commit_message>
Next step in presentation
</commit_message>
<xml_diff>
--- a/Hikikomori.pptx
+++ b/Hikikomori.pptx
@@ -5,7 +5,7 @@
     <p:sldMasterId id="2147483648" r:id="rId1"/>
   </p:sldMasterIdLst>
   <p:notesMasterIdLst>
-    <p:notesMasterId r:id="rId8"/>
+    <p:notesMasterId r:id="rId10"/>
   </p:notesMasterIdLst>
   <p:sldIdLst>
     <p:sldId id="260" r:id="rId2"/>
@@ -13,7 +13,9 @@
     <p:sldId id="261" r:id="rId4"/>
     <p:sldId id="262" r:id="rId5"/>
     <p:sldId id="256" r:id="rId6"/>
-    <p:sldId id="257" r:id="rId7"/>
+    <p:sldId id="264" r:id="rId7"/>
+    <p:sldId id="257" r:id="rId8"/>
+    <p:sldId id="263" r:id="rId9"/>
   </p:sldIdLst>
   <p:sldSz cx="12192000" cy="6858000"/>
   <p:notesSz cx="6858000" cy="9144000"/>
@@ -112,6 +114,11 @@
       </a:defRPr>
     </a:lvl9pPr>
   </p:defaultTextStyle>
+  <p:extLst>
+    <p:ext uri="{EFAFB233-063F-42B5-8137-9DF3F51BA10A}">
+      <p15:sldGuideLst xmlns:p15="http://schemas.microsoft.com/office/powerpoint/2012/main"/>
+    </p:ext>
+  </p:extLst>
 </p:presentation>
 </file>
 
@@ -2151,11 +2158,11 @@
           <a:p>
             <a:r>
               <a:rPr lang="en-GB" dirty="0"/>
-              <a:t>Na </a:t>
-            </a:r>
-            <a:r>
-              <a:rPr lang="en-GB" dirty="0" err="1"/>
-              <a:t>stronie</a:t>
+              <a:t>Ze </a:t>
+            </a:r>
+            <a:r>
+              <a:rPr lang="en-GB" dirty="0" err="1"/>
+              <a:t>strony</a:t>
             </a:r>
             <a:r>
               <a:rPr lang="en-GB" dirty="0"/>
@@ -2175,6 +2182,14 @@
             </a:r>
             <a:r>
               <a:rPr lang="en-GB" dirty="0"/>
+              <a:t> od </a:t>
+            </a:r>
+            <a:r>
+              <a:rPr lang="en-GB" dirty="0" err="1"/>
+              <a:t>razu</a:t>
+            </a:r>
+            <a:r>
+              <a:rPr lang="en-GB" dirty="0"/>
               <a:t> </a:t>
             </a:r>
             <a:r>
@@ -2185,6 +2200,83 @@
               <a:rPr lang="en-GB" dirty="0"/>
               <a:t> do </a:t>
             </a:r>
+            <a:r>
+              <a:rPr lang="en-GB" dirty="0" err="1"/>
+              <a:t>naszej</a:t>
+            </a:r>
+            <a:r>
+              <a:rPr lang="en-GB" dirty="0"/>
+              <a:t> </a:t>
+            </a:r>
+            <a:r>
+              <a:rPr lang="en-GB" dirty="0" err="1"/>
+              <a:t>głównej</a:t>
+            </a:r>
+            <a:r>
+              <a:rPr lang="en-GB" dirty="0"/>
+              <a:t> </a:t>
+            </a:r>
+            <a:r>
+              <a:rPr lang="en-GB" dirty="0" err="1"/>
+              <a:t>funkcjonalności</a:t>
+            </a:r>
+            <a:r>
+              <a:rPr lang="en-GB" dirty="0"/>
+              <a:t>, </a:t>
+            </a:r>
+            <a:r>
+              <a:rPr lang="en-GB" dirty="0" err="1"/>
+              <a:t>czyli</a:t>
+            </a:r>
+            <a:r>
+              <a:rPr lang="en-GB" dirty="0"/>
+              <a:t> make appointment, ale </a:t>
+            </a:r>
+            <a:r>
+              <a:rPr lang="en-GB" dirty="0" err="1"/>
+              <a:t>zanim</a:t>
+            </a:r>
+            <a:r>
+              <a:rPr lang="en-GB" dirty="0"/>
+              <a:t> do </a:t>
+            </a:r>
+            <a:r>
+              <a:rPr lang="en-GB" dirty="0" err="1"/>
+              <a:t>tego</a:t>
+            </a:r>
+            <a:r>
+              <a:rPr lang="en-GB" dirty="0"/>
+              <a:t> </a:t>
+            </a:r>
+            <a:r>
+              <a:rPr lang="en-GB" dirty="0" err="1"/>
+              <a:t>przejdziemy</a:t>
+            </a:r>
+            <a:r>
+              <a:rPr lang="en-GB" dirty="0"/>
+              <a:t> </a:t>
+            </a:r>
+            <a:r>
+              <a:rPr lang="en-GB" dirty="0" err="1"/>
+              <a:t>należy</a:t>
+            </a:r>
+            <a:r>
+              <a:rPr lang="en-GB" dirty="0"/>
+              <a:t> </a:t>
+            </a:r>
+            <a:r>
+              <a:rPr lang="en-GB" dirty="0" err="1"/>
+              <a:t>się</a:t>
+            </a:r>
+            <a:r>
+              <a:rPr lang="en-GB" dirty="0"/>
+              <a:t> </a:t>
+            </a:r>
+            <a:r>
+              <a:rPr lang="en-GB" dirty="0" err="1"/>
+              <a:t>zalogować</a:t>
+            </a:r>
+            <a:endParaRPr lang="en-GB" dirty="0"/>
           </a:p>
         </p:txBody>
       </p:sp>
@@ -2215,6 +2307,745 @@
     <p:extLst>
       <p:ext uri="{BB962C8B-B14F-4D97-AF65-F5344CB8AC3E}">
         <p14:creationId xmlns:p14="http://schemas.microsoft.com/office/powerpoint/2010/main" val="3092116628"/>
+      </p:ext>
+    </p:extLst>
+  </p:cSld>
+  <p:clrMapOvr>
+    <a:masterClrMapping/>
+  </p:clrMapOvr>
+</p:notes>
+</file>
+
+<file path=ppt/notesSlides/notesSlide6.xml><?xml version="1.0" encoding="utf-8"?>
+<p:notes xmlns:a="http://schemas.openxmlformats.org/drawingml/2006/main" xmlns:r="http://schemas.openxmlformats.org/officeDocument/2006/relationships" xmlns:p="http://schemas.openxmlformats.org/presentationml/2006/main">
+  <p:cSld>
+    <p:spTree>
+      <p:nvGrpSpPr>
+        <p:cNvPr id="1" name=""/>
+        <p:cNvGrpSpPr/>
+        <p:nvPr/>
+      </p:nvGrpSpPr>
+      <p:grpSpPr>
+        <a:xfrm>
+          <a:off x="0" y="0"/>
+          <a:ext cx="0" cy="0"/>
+          <a:chOff x="0" y="0"/>
+          <a:chExt cx="0" cy="0"/>
+        </a:xfrm>
+      </p:grpSpPr>
+      <p:sp>
+        <p:nvSpPr>
+          <p:cNvPr id="2" name="Slide Image Placeholder 1"/>
+          <p:cNvSpPr>
+            <a:spLocks noGrp="1" noRot="1" noChangeAspect="1"/>
+          </p:cNvSpPr>
+          <p:nvPr>
+            <p:ph type="sldImg"/>
+          </p:nvPr>
+        </p:nvSpPr>
+        <p:spPr/>
+      </p:sp>
+      <p:sp>
+        <p:nvSpPr>
+          <p:cNvPr id="3" name="Notes Placeholder 2"/>
+          <p:cNvSpPr>
+            <a:spLocks noGrp="1"/>
+          </p:cNvSpPr>
+          <p:nvPr>
+            <p:ph type="body" idx="1"/>
+          </p:nvPr>
+        </p:nvSpPr>
+        <p:spPr/>
+        <p:txBody>
+          <a:bodyPr/>
+          <a:lstStyle/>
+          <a:p>
+            <a:r>
+              <a:rPr lang="en-GB" dirty="0" err="1"/>
+              <a:t>Standardowe</a:t>
+            </a:r>
+            <a:r>
+              <a:rPr lang="en-GB" dirty="0"/>
+              <a:t> </a:t>
+            </a:r>
+            <a:r>
+              <a:rPr lang="en-GB" dirty="0" err="1"/>
+              <a:t>logowanie</a:t>
+            </a:r>
+            <a:r>
+              <a:rPr lang="en-GB" dirty="0"/>
+              <a:t>, </a:t>
+            </a:r>
+            <a:r>
+              <a:rPr lang="en-GB" dirty="0" err="1"/>
+              <a:t>nic</a:t>
+            </a:r>
+            <a:r>
+              <a:rPr lang="en-GB" dirty="0"/>
+              <a:t> </a:t>
+            </a:r>
+            <a:r>
+              <a:rPr lang="en-GB" dirty="0" err="1"/>
+              <a:t>ponad</a:t>
+            </a:r>
+            <a:r>
+              <a:rPr lang="en-GB" dirty="0"/>
+              <a:t> </a:t>
+            </a:r>
+            <a:r>
+              <a:rPr lang="en-GB"/>
+              <a:t>to.</a:t>
+            </a:r>
+            <a:endParaRPr lang="en-GB" dirty="0"/>
+          </a:p>
+        </p:txBody>
+      </p:sp>
+      <p:sp>
+        <p:nvSpPr>
+          <p:cNvPr id="4" name="Slide Number Placeholder 3"/>
+          <p:cNvSpPr>
+            <a:spLocks noGrp="1"/>
+          </p:cNvSpPr>
+          <p:nvPr>
+            <p:ph type="sldNum" sz="quarter" idx="5"/>
+          </p:nvPr>
+        </p:nvSpPr>
+        <p:spPr/>
+        <p:txBody>
+          <a:bodyPr/>
+          <a:lstStyle/>
+          <a:p>
+            <a:fld id="{C10FC1E4-721C-44D1-9B12-58FBE4837DB5}" type="slidenum">
+              <a:rPr lang="en-GB" smtClean="0"/>
+              <a:t>6</a:t>
+            </a:fld>
+            <a:endParaRPr lang="en-GB"/>
+          </a:p>
+        </p:txBody>
+      </p:sp>
+    </p:spTree>
+    <p:extLst>
+      <p:ext uri="{BB962C8B-B14F-4D97-AF65-F5344CB8AC3E}">
+        <p14:creationId xmlns:p14="http://schemas.microsoft.com/office/powerpoint/2010/main" val="4202030770"/>
+      </p:ext>
+    </p:extLst>
+  </p:cSld>
+  <p:clrMapOvr>
+    <a:masterClrMapping/>
+  </p:clrMapOvr>
+</p:notes>
+</file>
+
+<file path=ppt/notesSlides/notesSlide7.xml><?xml version="1.0" encoding="utf-8"?>
+<p:notes xmlns:a="http://schemas.openxmlformats.org/drawingml/2006/main" xmlns:r="http://schemas.openxmlformats.org/officeDocument/2006/relationships" xmlns:p="http://schemas.openxmlformats.org/presentationml/2006/main">
+  <p:cSld>
+    <p:spTree>
+      <p:nvGrpSpPr>
+        <p:cNvPr id="1" name=""/>
+        <p:cNvGrpSpPr/>
+        <p:nvPr/>
+      </p:nvGrpSpPr>
+      <p:grpSpPr>
+        <a:xfrm>
+          <a:off x="0" y="0"/>
+          <a:ext cx="0" cy="0"/>
+          <a:chOff x="0" y="0"/>
+          <a:chExt cx="0" cy="0"/>
+        </a:xfrm>
+      </p:grpSpPr>
+      <p:sp>
+        <p:nvSpPr>
+          <p:cNvPr id="2" name="Slide Image Placeholder 1"/>
+          <p:cNvSpPr>
+            <a:spLocks noGrp="1" noRot="1" noChangeAspect="1"/>
+          </p:cNvSpPr>
+          <p:nvPr>
+            <p:ph type="sldImg"/>
+          </p:nvPr>
+        </p:nvSpPr>
+        <p:spPr/>
+      </p:sp>
+      <p:sp>
+        <p:nvSpPr>
+          <p:cNvPr id="3" name="Notes Placeholder 2"/>
+          <p:cNvSpPr>
+            <a:spLocks noGrp="1"/>
+          </p:cNvSpPr>
+          <p:nvPr>
+            <p:ph type="body" idx="1"/>
+          </p:nvPr>
+        </p:nvSpPr>
+        <p:spPr/>
+        <p:txBody>
+          <a:bodyPr/>
+          <a:lstStyle/>
+          <a:p>
+            <a:pPr marL="0" marR="0" lvl="0" indent="0" algn="l" defTabSz="914400" rtl="0" eaLnBrk="1" fontAlgn="auto" latinLnBrk="0" hangingPunct="1">
+              <a:lnSpc>
+                <a:spcPct val="100000"/>
+              </a:lnSpc>
+              <a:spcBef>
+                <a:spcPts val="0"/>
+              </a:spcBef>
+              <a:spcAft>
+                <a:spcPts val="0"/>
+              </a:spcAft>
+              <a:buClrTx/>
+              <a:buSzTx/>
+              <a:buFontTx/>
+              <a:buNone/>
+              <a:tabLst/>
+              <a:defRPr/>
+            </a:pPr>
+            <a:r>
+              <a:rPr lang="en-GB" dirty="0"/>
+              <a:t>Jak </a:t>
+            </a:r>
+            <a:r>
+              <a:rPr lang="en-GB" dirty="0" err="1"/>
+              <a:t>widać</a:t>
+            </a:r>
+            <a:r>
+              <a:rPr lang="en-GB" dirty="0"/>
+              <a:t> </a:t>
+            </a:r>
+            <a:r>
+              <a:rPr lang="en-GB" dirty="0" err="1"/>
+              <a:t>mamy</a:t>
+            </a:r>
+            <a:r>
+              <a:rPr lang="en-GB" dirty="0"/>
+              <a:t> </a:t>
+            </a:r>
+            <a:r>
+              <a:rPr lang="en-GB" dirty="0" err="1"/>
+              <a:t>przed</a:t>
+            </a:r>
+            <a:r>
+              <a:rPr lang="en-GB" dirty="0"/>
+              <a:t> </a:t>
+            </a:r>
+            <a:r>
+              <a:rPr lang="en-GB" dirty="0" err="1"/>
+              <a:t>sobą</a:t>
+            </a:r>
+            <a:r>
+              <a:rPr lang="en-GB" dirty="0"/>
+              <a:t> </a:t>
+            </a:r>
+            <a:r>
+              <a:rPr lang="en-GB" dirty="0" err="1"/>
+              <a:t>prosty</a:t>
+            </a:r>
+            <a:r>
+              <a:rPr lang="en-GB" dirty="0"/>
+              <a:t> test </a:t>
+            </a:r>
+            <a:r>
+              <a:rPr lang="en-GB" dirty="0" err="1"/>
+              <a:t>pozwalający</a:t>
+            </a:r>
+            <a:r>
+              <a:rPr lang="en-GB" dirty="0"/>
+              <a:t> </a:t>
+            </a:r>
+            <a:r>
+              <a:rPr lang="en-GB" dirty="0" err="1"/>
+              <a:t>postawić</a:t>
+            </a:r>
+            <a:r>
+              <a:rPr lang="en-GB" dirty="0"/>
+              <a:t> </a:t>
+            </a:r>
+            <a:r>
+              <a:rPr lang="en-GB" dirty="0" err="1"/>
+              <a:t>diagnozę</a:t>
+            </a:r>
+            <a:r>
+              <a:rPr lang="en-GB" dirty="0"/>
+              <a:t> </a:t>
+            </a:r>
+            <a:r>
+              <a:rPr lang="en-GB" dirty="0" err="1"/>
+              <a:t>wstępną</a:t>
+            </a:r>
+            <a:r>
+              <a:rPr lang="en-GB" dirty="0"/>
+              <a:t> </a:t>
+            </a:r>
+            <a:r>
+              <a:rPr lang="en-GB" dirty="0" err="1"/>
+              <a:t>i</a:t>
+            </a:r>
+            <a:r>
+              <a:rPr lang="en-GB" dirty="0"/>
+              <a:t> </a:t>
+            </a:r>
+            <a:r>
+              <a:rPr lang="en-GB" dirty="0" err="1"/>
+              <a:t>przeniesie</a:t>
+            </a:r>
+            <a:r>
+              <a:rPr lang="en-GB" dirty="0"/>
+              <a:t> </a:t>
+            </a:r>
+            <a:r>
+              <a:rPr lang="en-GB" dirty="0" err="1"/>
+              <a:t>nas</a:t>
+            </a:r>
+            <a:r>
+              <a:rPr lang="en-GB" dirty="0"/>
+              <a:t> </a:t>
+            </a:r>
+            <a:r>
+              <a:rPr lang="en-GB" dirty="0" err="1"/>
+              <a:t>na</a:t>
+            </a:r>
+            <a:r>
+              <a:rPr lang="en-GB" dirty="0"/>
+              <a:t> </a:t>
+            </a:r>
+            <a:r>
+              <a:rPr lang="en-GB" dirty="0" err="1"/>
+              <a:t>stronę</a:t>
+            </a:r>
+            <a:r>
+              <a:rPr lang="en-GB" dirty="0"/>
+              <a:t> </a:t>
+            </a:r>
+            <a:r>
+              <a:rPr lang="en-GB" dirty="0" err="1"/>
+              <a:t>umawiającą</a:t>
+            </a:r>
+            <a:r>
+              <a:rPr lang="en-GB" dirty="0"/>
+              <a:t> </a:t>
+            </a:r>
+            <a:r>
+              <a:rPr lang="en-GB" dirty="0" err="1"/>
+              <a:t>wizyty</a:t>
+            </a:r>
+            <a:endParaRPr lang="en-GB" dirty="0"/>
+          </a:p>
+          <a:p>
+            <a:pPr marL="0" marR="0" lvl="0" indent="0" algn="l" defTabSz="914400" rtl="0" eaLnBrk="1" fontAlgn="auto" latinLnBrk="0" hangingPunct="1">
+              <a:lnSpc>
+                <a:spcPct val="100000"/>
+              </a:lnSpc>
+              <a:spcBef>
+                <a:spcPts val="0"/>
+              </a:spcBef>
+              <a:spcAft>
+                <a:spcPts val="0"/>
+              </a:spcAft>
+              <a:buClrTx/>
+              <a:buSzTx/>
+              <a:buFontTx/>
+              <a:buNone/>
+              <a:tabLst/>
+              <a:defRPr/>
+            </a:pPr>
+            <a:r>
+              <a:rPr lang="en-GB" dirty="0" err="1"/>
+              <a:t>Jeśli</a:t>
+            </a:r>
+            <a:r>
+              <a:rPr lang="en-GB" dirty="0"/>
+              <a:t> jest to </a:t>
+            </a:r>
+            <a:r>
+              <a:rPr lang="en-GB" dirty="0" err="1"/>
+              <a:t>lekarz</a:t>
+            </a:r>
+            <a:r>
+              <a:rPr lang="en-GB" dirty="0"/>
+              <a:t> </a:t>
+            </a:r>
+            <a:r>
+              <a:rPr lang="en-GB" dirty="0" err="1"/>
+              <a:t>specjalista</a:t>
+            </a:r>
+            <a:r>
+              <a:rPr lang="en-GB" dirty="0"/>
+              <a:t> to </a:t>
+            </a:r>
+            <a:r>
+              <a:rPr lang="en-GB" dirty="0" err="1"/>
+              <a:t>użytkownik</a:t>
+            </a:r>
+            <a:r>
+              <a:rPr lang="en-GB" dirty="0"/>
+              <a:t> </a:t>
+            </a:r>
+            <a:r>
+              <a:rPr lang="en-GB" dirty="0" err="1"/>
+              <a:t>dostanie</a:t>
+            </a:r>
+            <a:r>
+              <a:rPr lang="en-GB" dirty="0"/>
+              <a:t> </a:t>
+            </a:r>
+            <a:r>
+              <a:rPr lang="en-GB" dirty="0" err="1"/>
+              <a:t>opcje</a:t>
+            </a:r>
+            <a:r>
+              <a:rPr lang="en-GB" dirty="0"/>
+              <a:t> </a:t>
+            </a:r>
+            <a:r>
+              <a:rPr lang="en-GB" dirty="0" err="1"/>
+              <a:t>na</a:t>
+            </a:r>
+            <a:r>
+              <a:rPr lang="en-GB" dirty="0"/>
+              <a:t> </a:t>
+            </a:r>
+            <a:r>
+              <a:rPr lang="en-GB" dirty="0" err="1"/>
+              <a:t>szybką</a:t>
+            </a:r>
+            <a:r>
+              <a:rPr lang="en-GB" dirty="0"/>
+              <a:t> e-</a:t>
+            </a:r>
+            <a:r>
+              <a:rPr lang="en-GB" dirty="0" err="1"/>
+              <a:t>wizytę</a:t>
+            </a:r>
+            <a:r>
+              <a:rPr lang="en-GB" dirty="0"/>
+              <a:t> do </a:t>
+            </a:r>
+            <a:r>
+              <a:rPr lang="en-GB" dirty="0" err="1"/>
+              <a:t>internisty</a:t>
+            </a:r>
+            <a:r>
+              <a:rPr lang="en-GB" dirty="0"/>
+              <a:t>, </a:t>
+            </a:r>
+            <a:r>
+              <a:rPr lang="en-GB" dirty="0" err="1"/>
+              <a:t>który</a:t>
+            </a:r>
+            <a:r>
+              <a:rPr lang="en-GB" dirty="0"/>
+              <a:t> </a:t>
+            </a:r>
+            <a:r>
+              <a:rPr lang="en-GB" dirty="0" err="1"/>
+              <a:t>wystawi</a:t>
+            </a:r>
+            <a:r>
+              <a:rPr lang="en-GB" dirty="0"/>
+              <a:t> </a:t>
+            </a:r>
+            <a:r>
+              <a:rPr lang="en-GB" dirty="0" err="1"/>
+              <a:t>skierowanie</a:t>
+            </a:r>
+            <a:r>
+              <a:rPr lang="en-GB" dirty="0"/>
+              <a:t>.</a:t>
+            </a:r>
+          </a:p>
+          <a:p>
+            <a:endParaRPr lang="en-GB" dirty="0"/>
+          </a:p>
+        </p:txBody>
+      </p:sp>
+      <p:sp>
+        <p:nvSpPr>
+          <p:cNvPr id="4" name="Slide Number Placeholder 3"/>
+          <p:cNvSpPr>
+            <a:spLocks noGrp="1"/>
+          </p:cNvSpPr>
+          <p:nvPr>
+            <p:ph type="sldNum" sz="quarter" idx="5"/>
+          </p:nvPr>
+        </p:nvSpPr>
+        <p:spPr/>
+        <p:txBody>
+          <a:bodyPr/>
+          <a:lstStyle/>
+          <a:p>
+            <a:fld id="{C10FC1E4-721C-44D1-9B12-58FBE4837DB5}" type="slidenum">
+              <a:rPr lang="en-GB" smtClean="0"/>
+              <a:t>7</a:t>
+            </a:fld>
+            <a:endParaRPr lang="en-GB"/>
+          </a:p>
+        </p:txBody>
+      </p:sp>
+    </p:spTree>
+    <p:extLst>
+      <p:ext uri="{BB962C8B-B14F-4D97-AF65-F5344CB8AC3E}">
+        <p14:creationId xmlns:p14="http://schemas.microsoft.com/office/powerpoint/2010/main" val="3517192117"/>
+      </p:ext>
+    </p:extLst>
+  </p:cSld>
+  <p:clrMapOvr>
+    <a:masterClrMapping/>
+  </p:clrMapOvr>
+</p:notes>
+</file>
+
+<file path=ppt/notesSlides/notesSlide8.xml><?xml version="1.0" encoding="utf-8"?>
+<p:notes xmlns:a="http://schemas.openxmlformats.org/drawingml/2006/main" xmlns:r="http://schemas.openxmlformats.org/officeDocument/2006/relationships" xmlns:p="http://schemas.openxmlformats.org/presentationml/2006/main">
+  <p:cSld>
+    <p:spTree>
+      <p:nvGrpSpPr>
+        <p:cNvPr id="1" name=""/>
+        <p:cNvGrpSpPr/>
+        <p:nvPr/>
+      </p:nvGrpSpPr>
+      <p:grpSpPr>
+        <a:xfrm>
+          <a:off x="0" y="0"/>
+          <a:ext cx="0" cy="0"/>
+          <a:chOff x="0" y="0"/>
+          <a:chExt cx="0" cy="0"/>
+        </a:xfrm>
+      </p:grpSpPr>
+      <p:sp>
+        <p:nvSpPr>
+          <p:cNvPr id="2" name="Slide Image Placeholder 1"/>
+          <p:cNvSpPr>
+            <a:spLocks noGrp="1" noRot="1" noChangeAspect="1"/>
+          </p:cNvSpPr>
+          <p:nvPr>
+            <p:ph type="sldImg"/>
+          </p:nvPr>
+        </p:nvSpPr>
+        <p:spPr/>
+      </p:sp>
+      <p:sp>
+        <p:nvSpPr>
+          <p:cNvPr id="3" name="Notes Placeholder 2"/>
+          <p:cNvSpPr>
+            <a:spLocks noGrp="1"/>
+          </p:cNvSpPr>
+          <p:nvPr>
+            <p:ph type="body" idx="1"/>
+          </p:nvPr>
+        </p:nvSpPr>
+        <p:spPr/>
+        <p:txBody>
+          <a:bodyPr/>
+          <a:lstStyle/>
+          <a:p>
+            <a:pPr marL="0" marR="0" lvl="0" indent="0" algn="l" defTabSz="914400" rtl="0" eaLnBrk="1" fontAlgn="auto" latinLnBrk="0" hangingPunct="1">
+              <a:lnSpc>
+                <a:spcPct val="100000"/>
+              </a:lnSpc>
+              <a:spcBef>
+                <a:spcPts val="0"/>
+              </a:spcBef>
+              <a:spcAft>
+                <a:spcPts val="0"/>
+              </a:spcAft>
+              <a:buClrTx/>
+              <a:buSzTx/>
+              <a:buFontTx/>
+              <a:buNone/>
+              <a:tabLst/>
+              <a:defRPr/>
+            </a:pPr>
+            <a:r>
+              <a:rPr lang="en-GB" dirty="0"/>
+              <a:t>W </a:t>
+            </a:r>
+            <a:r>
+              <a:rPr lang="en-GB" dirty="0" err="1"/>
+              <a:t>kalendarzu</a:t>
+            </a:r>
+            <a:r>
+              <a:rPr lang="en-GB" dirty="0"/>
+              <a:t> </a:t>
+            </a:r>
+            <a:r>
+              <a:rPr lang="en-GB" dirty="0" err="1"/>
+              <a:t>możemy</a:t>
+            </a:r>
+            <a:r>
+              <a:rPr lang="en-GB" dirty="0"/>
+              <a:t> </a:t>
+            </a:r>
+            <a:r>
+              <a:rPr lang="en-GB" dirty="0" err="1"/>
+              <a:t>zobaczyć</a:t>
+            </a:r>
+            <a:r>
+              <a:rPr lang="en-GB" dirty="0"/>
+              <a:t> </a:t>
+            </a:r>
+            <a:r>
+              <a:rPr lang="en-GB" dirty="0" err="1"/>
+              <a:t>nadchodzące</a:t>
+            </a:r>
+            <a:r>
+              <a:rPr lang="en-GB" dirty="0"/>
+              <a:t> </a:t>
+            </a:r>
+            <a:r>
+              <a:rPr lang="en-GB" dirty="0" err="1"/>
+              <a:t>wizyty</a:t>
+            </a:r>
+            <a:r>
+              <a:rPr lang="en-GB" dirty="0"/>
+              <a:t> </a:t>
+            </a:r>
+            <a:r>
+              <a:rPr lang="en-GB" dirty="0" err="1"/>
+              <a:t>lub</a:t>
+            </a:r>
+            <a:r>
+              <a:rPr lang="en-GB" dirty="0"/>
+              <a:t> je </a:t>
+            </a:r>
+            <a:r>
+              <a:rPr lang="en-GB" dirty="0" err="1"/>
+              <a:t>usunąć</a:t>
+            </a:r>
+            <a:r>
+              <a:rPr lang="en-GB" dirty="0"/>
+              <a:t>, </a:t>
+            </a:r>
+            <a:r>
+              <a:rPr lang="en-GB" dirty="0" err="1"/>
+              <a:t>standardowa</a:t>
+            </a:r>
+            <a:r>
+              <a:rPr lang="en-GB" dirty="0"/>
+              <a:t> </a:t>
+            </a:r>
+            <a:r>
+              <a:rPr lang="en-GB" dirty="0" err="1"/>
+              <a:t>opcja</a:t>
+            </a:r>
+            <a:r>
+              <a:rPr lang="en-GB" dirty="0"/>
+              <a:t> </a:t>
+            </a:r>
+            <a:r>
+              <a:rPr lang="en-GB" dirty="0" err="1"/>
+              <a:t>nie</a:t>
+            </a:r>
+            <a:r>
+              <a:rPr lang="en-GB" dirty="0"/>
+              <a:t> </a:t>
+            </a:r>
+            <a:r>
+              <a:rPr lang="en-GB" dirty="0" err="1"/>
+              <a:t>chcieliśmy</a:t>
+            </a:r>
+            <a:r>
+              <a:rPr lang="en-GB" dirty="0"/>
+              <a:t> </a:t>
+            </a:r>
+            <a:r>
+              <a:rPr lang="en-GB" dirty="0" err="1"/>
+              <a:t>przytłaczać</a:t>
+            </a:r>
+            <a:r>
+              <a:rPr lang="en-GB" dirty="0"/>
+              <a:t> </a:t>
+            </a:r>
+            <a:r>
+              <a:rPr lang="en-GB" dirty="0" err="1"/>
+              <a:t>użytkownika</a:t>
+            </a:r>
+            <a:r>
+              <a:rPr lang="en-GB" dirty="0"/>
+              <a:t> jak </a:t>
+            </a:r>
+            <a:r>
+              <a:rPr lang="en-GB" dirty="0" err="1"/>
+              <a:t>również</a:t>
+            </a:r>
+            <a:r>
+              <a:rPr lang="en-GB" dirty="0"/>
+              <a:t>, </a:t>
+            </a:r>
+            <a:r>
+              <a:rPr lang="en-GB" dirty="0" err="1"/>
+              <a:t>nie</a:t>
+            </a:r>
+            <a:r>
+              <a:rPr lang="en-GB" dirty="0"/>
+              <a:t> </a:t>
+            </a:r>
+            <a:r>
+              <a:rPr lang="en-GB" dirty="0" err="1"/>
+              <a:t>oszukujmy</a:t>
+            </a:r>
+            <a:r>
+              <a:rPr lang="en-GB" dirty="0"/>
+              <a:t> </a:t>
+            </a:r>
+            <a:r>
+              <a:rPr lang="en-GB" dirty="0" err="1"/>
+              <a:t>się</a:t>
+            </a:r>
+            <a:r>
+              <a:rPr lang="en-GB" dirty="0"/>
+              <a:t>, </a:t>
+            </a:r>
+            <a:r>
+              <a:rPr lang="en-GB" dirty="0" err="1"/>
+              <a:t>czasu</a:t>
+            </a:r>
+            <a:r>
+              <a:rPr lang="en-GB" dirty="0"/>
+              <a:t> </a:t>
+            </a:r>
+            <a:r>
+              <a:rPr lang="en-GB" dirty="0" err="1"/>
+              <a:t>było</a:t>
+            </a:r>
+            <a:r>
+              <a:rPr lang="en-GB" dirty="0"/>
+              <a:t> </a:t>
+            </a:r>
+            <a:r>
+              <a:rPr lang="en-GB" dirty="0" err="1"/>
+              <a:t>niewiele</a:t>
+            </a:r>
+            <a:endParaRPr lang="en-GB" dirty="0"/>
+          </a:p>
+          <a:p>
+            <a:endParaRPr lang="en-GB" dirty="0"/>
+          </a:p>
+        </p:txBody>
+      </p:sp>
+      <p:sp>
+        <p:nvSpPr>
+          <p:cNvPr id="4" name="Slide Number Placeholder 3"/>
+          <p:cNvSpPr>
+            <a:spLocks noGrp="1"/>
+          </p:cNvSpPr>
+          <p:nvPr>
+            <p:ph type="sldNum" sz="quarter" idx="5"/>
+          </p:nvPr>
+        </p:nvSpPr>
+        <p:spPr/>
+        <p:txBody>
+          <a:bodyPr/>
+          <a:lstStyle/>
+          <a:p>
+            <a:fld id="{C10FC1E4-721C-44D1-9B12-58FBE4837DB5}" type="slidenum">
+              <a:rPr lang="en-GB" smtClean="0"/>
+              <a:t>8</a:t>
+            </a:fld>
+            <a:endParaRPr lang="en-GB"/>
+          </a:p>
+        </p:txBody>
+      </p:sp>
+    </p:spTree>
+    <p:extLst>
+      <p:ext uri="{BB962C8B-B14F-4D97-AF65-F5344CB8AC3E}">
+        <p14:creationId xmlns:p14="http://schemas.microsoft.com/office/powerpoint/2010/main" val="2646870712"/>
       </p:ext>
     </p:extLst>
   </p:cSld>
@@ -6472,15 +7303,15 @@
           <p:cNvPr id="2" name="Title 1">
             <a:extLst>
               <a:ext uri="{FF2B5EF4-FFF2-40B4-BE49-F238E27FC236}">
-                <a16:creationId xmlns:a16="http://schemas.microsoft.com/office/drawing/2014/main" id="{C83037AD-3F1B-42E5-96A8-C7E5DEDAA7BD}"/>
-              </a:ext>
-            </a:extLst>
-          </p:cNvPr>
-          <p:cNvSpPr>
-            <a:spLocks noGrp="1"/>
-          </p:cNvSpPr>
-          <p:nvPr>
-            <p:ph type="title"/>
+                <a16:creationId xmlns:a16="http://schemas.microsoft.com/office/drawing/2014/main" id="{6D5EDCA7-5D3F-4A51-95A0-AC1410CBD777}"/>
+              </a:ext>
+            </a:extLst>
+          </p:cNvPr>
+          <p:cNvSpPr>
+            <a:spLocks noGrp="1"/>
+          </p:cNvSpPr>
+          <p:nvPr>
+            <p:ph type="ctrTitle"/>
           </p:nvPr>
         </p:nvSpPr>
         <p:spPr/>
@@ -6488,24 +7319,24 @@
           <a:bodyPr/>
           <a:lstStyle/>
           <a:p>
-            <a:endParaRPr lang="en-GB"/>
-          </a:p>
-        </p:txBody>
-      </p:sp>
-      <p:sp>
-        <p:nvSpPr>
-          <p:cNvPr id="3" name="Content Placeholder 2">
-            <a:extLst>
-              <a:ext uri="{FF2B5EF4-FFF2-40B4-BE49-F238E27FC236}">
-                <a16:creationId xmlns:a16="http://schemas.microsoft.com/office/drawing/2014/main" id="{D6F3480E-E341-440A-936B-C847413609AC}"/>
-              </a:ext>
-            </a:extLst>
-          </p:cNvPr>
-          <p:cNvSpPr>
-            <a:spLocks noGrp="1"/>
-          </p:cNvSpPr>
-          <p:nvPr>
-            <p:ph idx="1"/>
+            <a:endParaRPr lang="en-GB" dirty="0"/>
+          </a:p>
+        </p:txBody>
+      </p:sp>
+      <p:sp>
+        <p:nvSpPr>
+          <p:cNvPr id="3" name="Subtitle 2">
+            <a:extLst>
+              <a:ext uri="{FF2B5EF4-FFF2-40B4-BE49-F238E27FC236}">
+                <a16:creationId xmlns:a16="http://schemas.microsoft.com/office/drawing/2014/main" id="{E6FB590C-80AB-4A4A-8578-6BE330B0E468}"/>
+              </a:ext>
+            </a:extLst>
+          </p:cNvPr>
+          <p:cNvSpPr>
+            <a:spLocks noGrp="1"/>
+          </p:cNvSpPr>
+          <p:nvPr>
+            <p:ph type="subTitle" idx="1"/>
           </p:nvPr>
         </p:nvSpPr>
         <p:spPr/>
@@ -6522,7 +7353,7 @@
           <p:cNvPr id="5" name="Picture 4">
             <a:extLst>
               <a:ext uri="{FF2B5EF4-FFF2-40B4-BE49-F238E27FC236}">
-                <a16:creationId xmlns:a16="http://schemas.microsoft.com/office/drawing/2014/main" id="{48E4E5B5-674B-455B-99EC-042FFC06E138}"/>
+                <a16:creationId xmlns:a16="http://schemas.microsoft.com/office/drawing/2014/main" id="{91837703-CE92-48A2-9F5D-FC7DFB2C2F7D}"/>
               </a:ext>
             </a:extLst>
           </p:cNvPr>
@@ -6532,7 +7363,7 @@
           <p:nvPr/>
         </p:nvPicPr>
         <p:blipFill>
-          <a:blip r:embed="rId2"/>
+          <a:blip r:embed="rId3"/>
           <a:stretch>
             <a:fillRect/>
           </a:stretch>
@@ -6552,7 +7383,7 @@
           <p:cNvPr id="7" name="pole tekstowe 3">
             <a:extLst>
               <a:ext uri="{FF2B5EF4-FFF2-40B4-BE49-F238E27FC236}">
-                <a16:creationId xmlns:a16="http://schemas.microsoft.com/office/drawing/2014/main" id="{A5743228-9146-4A88-A34C-1F377F6C62C5}"/>
+                <a16:creationId xmlns:a16="http://schemas.microsoft.com/office/drawing/2014/main" id="{8BABB1BB-364E-4EA6-AAF1-10F5ED3CBC30}"/>
               </a:ext>
             </a:extLst>
           </p:cNvPr>
@@ -6586,10 +7417,414 @@
           </a:p>
         </p:txBody>
       </p:sp>
+      <p:sp>
+        <p:nvSpPr>
+          <p:cNvPr id="4" name="TextBox 3">
+            <a:extLst>
+              <a:ext uri="{FF2B5EF4-FFF2-40B4-BE49-F238E27FC236}">
+                <a16:creationId xmlns:a16="http://schemas.microsoft.com/office/drawing/2014/main" id="{E7FBE27B-CBFC-4901-9698-896C5D979E85}"/>
+              </a:ext>
+            </a:extLst>
+          </p:cNvPr>
+          <p:cNvSpPr txBox="1"/>
+          <p:nvPr/>
+        </p:nvSpPr>
+        <p:spPr>
+          <a:xfrm>
+            <a:off x="4166483" y="2981739"/>
+            <a:ext cx="1151021" cy="369332"/>
+          </a:xfrm>
+          <a:prstGeom prst="rect">
+            <a:avLst/>
+          </a:prstGeom>
+          <a:noFill/>
+        </p:spPr>
+        <p:txBody>
+          <a:bodyPr wrap="none" rtlCol="0">
+            <a:spAutoFit/>
+          </a:bodyPr>
+          <a:lstStyle/>
+          <a:p>
+            <a:r>
+              <a:rPr lang="en-GB" dirty="0" err="1"/>
+              <a:t>logowanie</a:t>
+            </a:r>
+            <a:endParaRPr lang="en-GB" dirty="0"/>
+          </a:p>
+        </p:txBody>
+      </p:sp>
+    </p:spTree>
+    <p:extLst>
+      <p:ext uri="{BB962C8B-B14F-4D97-AF65-F5344CB8AC3E}">
+        <p14:creationId xmlns:p14="http://schemas.microsoft.com/office/powerpoint/2010/main" val="1953538467"/>
+      </p:ext>
+    </p:extLst>
+  </p:cSld>
+  <p:clrMapOvr>
+    <a:masterClrMapping/>
+  </p:clrMapOvr>
+</p:sld>
+</file>
+
+<file path=ppt/slides/slide7.xml><?xml version="1.0" encoding="utf-8"?>
+<p:sld xmlns:a="http://schemas.openxmlformats.org/drawingml/2006/main" xmlns:r="http://schemas.openxmlformats.org/officeDocument/2006/relationships" xmlns:p="http://schemas.openxmlformats.org/presentationml/2006/main">
+  <p:cSld>
+    <p:spTree>
+      <p:nvGrpSpPr>
+        <p:cNvPr id="1" name=""/>
+        <p:cNvGrpSpPr/>
+        <p:nvPr/>
+      </p:nvGrpSpPr>
+      <p:grpSpPr>
+        <a:xfrm>
+          <a:off x="0" y="0"/>
+          <a:ext cx="0" cy="0"/>
+          <a:chOff x="0" y="0"/>
+          <a:chExt cx="0" cy="0"/>
+        </a:xfrm>
+      </p:grpSpPr>
+      <p:sp>
+        <p:nvSpPr>
+          <p:cNvPr id="2" name="Title 1">
+            <a:extLst>
+              <a:ext uri="{FF2B5EF4-FFF2-40B4-BE49-F238E27FC236}">
+                <a16:creationId xmlns:a16="http://schemas.microsoft.com/office/drawing/2014/main" id="{C83037AD-3F1B-42E5-96A8-C7E5DEDAA7BD}"/>
+              </a:ext>
+            </a:extLst>
+          </p:cNvPr>
+          <p:cNvSpPr>
+            <a:spLocks noGrp="1"/>
+          </p:cNvSpPr>
+          <p:nvPr>
+            <p:ph type="title"/>
+          </p:nvPr>
+        </p:nvSpPr>
+        <p:spPr/>
+        <p:txBody>
+          <a:bodyPr/>
+          <a:lstStyle/>
+          <a:p>
+            <a:endParaRPr lang="en-GB"/>
+          </a:p>
+        </p:txBody>
+      </p:sp>
+      <p:sp>
+        <p:nvSpPr>
+          <p:cNvPr id="3" name="Content Placeholder 2">
+            <a:extLst>
+              <a:ext uri="{FF2B5EF4-FFF2-40B4-BE49-F238E27FC236}">
+                <a16:creationId xmlns:a16="http://schemas.microsoft.com/office/drawing/2014/main" id="{D6F3480E-E341-440A-936B-C847413609AC}"/>
+              </a:ext>
+            </a:extLst>
+          </p:cNvPr>
+          <p:cNvSpPr>
+            <a:spLocks noGrp="1"/>
+          </p:cNvSpPr>
+          <p:nvPr>
+            <p:ph idx="1"/>
+          </p:nvPr>
+        </p:nvSpPr>
+        <p:spPr/>
+        <p:txBody>
+          <a:bodyPr/>
+          <a:lstStyle/>
+          <a:p>
+            <a:endParaRPr lang="en-GB"/>
+          </a:p>
+        </p:txBody>
+      </p:sp>
+      <p:pic>
+        <p:nvPicPr>
+          <p:cNvPr id="5" name="Picture 4">
+            <a:extLst>
+              <a:ext uri="{FF2B5EF4-FFF2-40B4-BE49-F238E27FC236}">
+                <a16:creationId xmlns:a16="http://schemas.microsoft.com/office/drawing/2014/main" id="{48E4E5B5-674B-455B-99EC-042FFC06E138}"/>
+              </a:ext>
+            </a:extLst>
+          </p:cNvPr>
+          <p:cNvPicPr>
+            <a:picLocks noChangeAspect="1"/>
+          </p:cNvPicPr>
+          <p:nvPr/>
+        </p:nvPicPr>
+        <p:blipFill>
+          <a:blip r:embed="rId3"/>
+          <a:stretch>
+            <a:fillRect/>
+          </a:stretch>
+        </p:blipFill>
+        <p:spPr>
+          <a:xfrm>
+            <a:off x="0" y="0"/>
+            <a:ext cx="12192000" cy="6858000"/>
+          </a:xfrm>
+          <a:prstGeom prst="rect">
+            <a:avLst/>
+          </a:prstGeom>
+        </p:spPr>
+      </p:pic>
+      <p:sp>
+        <p:nvSpPr>
+          <p:cNvPr id="7" name="pole tekstowe 3">
+            <a:extLst>
+              <a:ext uri="{FF2B5EF4-FFF2-40B4-BE49-F238E27FC236}">
+                <a16:creationId xmlns:a16="http://schemas.microsoft.com/office/drawing/2014/main" id="{A5743228-9146-4A88-A34C-1F377F6C62C5}"/>
+              </a:ext>
+            </a:extLst>
+          </p:cNvPr>
+          <p:cNvSpPr txBox="1"/>
+          <p:nvPr/>
+        </p:nvSpPr>
+        <p:spPr>
+          <a:xfrm>
+            <a:off x="0" y="6457890"/>
+            <a:ext cx="7896225" cy="400110"/>
+          </a:xfrm>
+          <a:prstGeom prst="rect">
+            <a:avLst/>
+          </a:prstGeom>
+          <a:noFill/>
+        </p:spPr>
+        <p:txBody>
+          <a:bodyPr wrap="square" rtlCol="0">
+            <a:spAutoFit/>
+          </a:bodyPr>
+          <a:lstStyle/>
+          <a:p>
+            <a:r>
+              <a:rPr lang="en-US" sz="2000" spc="1000" dirty="0">
+                <a:solidFill>
+                  <a:srgbClr val="F2B800"/>
+                </a:solidFill>
+              </a:rPr>
+              <a:t>HIKIKOMORI</a:t>
+            </a:r>
+          </a:p>
+        </p:txBody>
+      </p:sp>
+      <p:sp>
+        <p:nvSpPr>
+          <p:cNvPr id="4" name="TextBox 3">
+            <a:extLst>
+              <a:ext uri="{FF2B5EF4-FFF2-40B4-BE49-F238E27FC236}">
+                <a16:creationId xmlns:a16="http://schemas.microsoft.com/office/drawing/2014/main" id="{74BABAF9-ACA0-4EA6-AEA7-4ABEBBFB434D}"/>
+              </a:ext>
+            </a:extLst>
+          </p:cNvPr>
+          <p:cNvSpPr txBox="1"/>
+          <p:nvPr/>
+        </p:nvSpPr>
+        <p:spPr>
+          <a:xfrm>
+            <a:off x="3288154" y="2955029"/>
+            <a:ext cx="5903554" cy="369332"/>
+          </a:xfrm>
+          <a:prstGeom prst="rect">
+            <a:avLst/>
+          </a:prstGeom>
+          <a:noFill/>
+        </p:spPr>
+        <p:txBody>
+          <a:bodyPr wrap="square" rtlCol="0">
+            <a:spAutoFit/>
+          </a:bodyPr>
+          <a:lstStyle/>
+          <a:p>
+            <a:r>
+              <a:rPr lang="en-GB" dirty="0"/>
+              <a:t>MAKE APPOINTMENT</a:t>
+            </a:r>
+          </a:p>
+        </p:txBody>
+      </p:sp>
     </p:spTree>
     <p:extLst>
       <p:ext uri="{BB962C8B-B14F-4D97-AF65-F5344CB8AC3E}">
         <p14:creationId xmlns:p14="http://schemas.microsoft.com/office/powerpoint/2010/main" val="1738477491"/>
+      </p:ext>
+    </p:extLst>
+  </p:cSld>
+  <p:clrMapOvr>
+    <a:masterClrMapping/>
+  </p:clrMapOvr>
+</p:sld>
+</file>
+
+<file path=ppt/slides/slide8.xml><?xml version="1.0" encoding="utf-8"?>
+<p:sld xmlns:a="http://schemas.openxmlformats.org/drawingml/2006/main" xmlns:r="http://schemas.openxmlformats.org/officeDocument/2006/relationships" xmlns:p="http://schemas.openxmlformats.org/presentationml/2006/main">
+  <p:cSld>
+    <p:spTree>
+      <p:nvGrpSpPr>
+        <p:cNvPr id="1" name=""/>
+        <p:cNvGrpSpPr/>
+        <p:nvPr/>
+      </p:nvGrpSpPr>
+      <p:grpSpPr>
+        <a:xfrm>
+          <a:off x="0" y="0"/>
+          <a:ext cx="0" cy="0"/>
+          <a:chOff x="0" y="0"/>
+          <a:chExt cx="0" cy="0"/>
+        </a:xfrm>
+      </p:grpSpPr>
+      <p:sp>
+        <p:nvSpPr>
+          <p:cNvPr id="2" name="Title 1">
+            <a:extLst>
+              <a:ext uri="{FF2B5EF4-FFF2-40B4-BE49-F238E27FC236}">
+                <a16:creationId xmlns:a16="http://schemas.microsoft.com/office/drawing/2014/main" id="{C83037AD-3F1B-42E5-96A8-C7E5DEDAA7BD}"/>
+              </a:ext>
+            </a:extLst>
+          </p:cNvPr>
+          <p:cNvSpPr>
+            <a:spLocks noGrp="1"/>
+          </p:cNvSpPr>
+          <p:nvPr>
+            <p:ph type="title"/>
+          </p:nvPr>
+        </p:nvSpPr>
+        <p:spPr/>
+        <p:txBody>
+          <a:bodyPr/>
+          <a:lstStyle/>
+          <a:p>
+            <a:endParaRPr lang="en-GB"/>
+          </a:p>
+        </p:txBody>
+      </p:sp>
+      <p:sp>
+        <p:nvSpPr>
+          <p:cNvPr id="3" name="Content Placeholder 2">
+            <a:extLst>
+              <a:ext uri="{FF2B5EF4-FFF2-40B4-BE49-F238E27FC236}">
+                <a16:creationId xmlns:a16="http://schemas.microsoft.com/office/drawing/2014/main" id="{D6F3480E-E341-440A-936B-C847413609AC}"/>
+              </a:ext>
+            </a:extLst>
+          </p:cNvPr>
+          <p:cNvSpPr>
+            <a:spLocks noGrp="1"/>
+          </p:cNvSpPr>
+          <p:nvPr>
+            <p:ph idx="1"/>
+          </p:nvPr>
+        </p:nvSpPr>
+        <p:spPr/>
+        <p:txBody>
+          <a:bodyPr/>
+          <a:lstStyle/>
+          <a:p>
+            <a:endParaRPr lang="en-GB"/>
+          </a:p>
+        </p:txBody>
+      </p:sp>
+      <p:pic>
+        <p:nvPicPr>
+          <p:cNvPr id="5" name="Picture 4">
+            <a:extLst>
+              <a:ext uri="{FF2B5EF4-FFF2-40B4-BE49-F238E27FC236}">
+                <a16:creationId xmlns:a16="http://schemas.microsoft.com/office/drawing/2014/main" id="{48E4E5B5-674B-455B-99EC-042FFC06E138}"/>
+              </a:ext>
+            </a:extLst>
+          </p:cNvPr>
+          <p:cNvPicPr>
+            <a:picLocks noChangeAspect="1"/>
+          </p:cNvPicPr>
+          <p:nvPr/>
+        </p:nvPicPr>
+        <p:blipFill>
+          <a:blip r:embed="rId3"/>
+          <a:stretch>
+            <a:fillRect/>
+          </a:stretch>
+        </p:blipFill>
+        <p:spPr>
+          <a:xfrm>
+            <a:off x="0" y="0"/>
+            <a:ext cx="12192000" cy="6858000"/>
+          </a:xfrm>
+          <a:prstGeom prst="rect">
+            <a:avLst/>
+          </a:prstGeom>
+        </p:spPr>
+      </p:pic>
+      <p:sp>
+        <p:nvSpPr>
+          <p:cNvPr id="7" name="pole tekstowe 3">
+            <a:extLst>
+              <a:ext uri="{FF2B5EF4-FFF2-40B4-BE49-F238E27FC236}">
+                <a16:creationId xmlns:a16="http://schemas.microsoft.com/office/drawing/2014/main" id="{A5743228-9146-4A88-A34C-1F377F6C62C5}"/>
+              </a:ext>
+            </a:extLst>
+          </p:cNvPr>
+          <p:cNvSpPr txBox="1"/>
+          <p:nvPr/>
+        </p:nvSpPr>
+        <p:spPr>
+          <a:xfrm>
+            <a:off x="0" y="6457890"/>
+            <a:ext cx="7896225" cy="400110"/>
+          </a:xfrm>
+          <a:prstGeom prst="rect">
+            <a:avLst/>
+          </a:prstGeom>
+          <a:noFill/>
+        </p:spPr>
+        <p:txBody>
+          <a:bodyPr wrap="square" rtlCol="0">
+            <a:spAutoFit/>
+          </a:bodyPr>
+          <a:lstStyle/>
+          <a:p>
+            <a:r>
+              <a:rPr lang="en-US" sz="2000" spc="1000" dirty="0">
+                <a:solidFill>
+                  <a:srgbClr val="F2B800"/>
+                </a:solidFill>
+              </a:rPr>
+              <a:t>HIKIKOMORI</a:t>
+            </a:r>
+          </a:p>
+        </p:txBody>
+      </p:sp>
+      <p:sp>
+        <p:nvSpPr>
+          <p:cNvPr id="4" name="TextBox 3">
+            <a:extLst>
+              <a:ext uri="{FF2B5EF4-FFF2-40B4-BE49-F238E27FC236}">
+                <a16:creationId xmlns:a16="http://schemas.microsoft.com/office/drawing/2014/main" id="{74BABAF9-ACA0-4EA6-AEA7-4ABEBBFB434D}"/>
+              </a:ext>
+            </a:extLst>
+          </p:cNvPr>
+          <p:cNvSpPr txBox="1"/>
+          <p:nvPr/>
+        </p:nvSpPr>
+        <p:spPr>
+          <a:xfrm>
+            <a:off x="3288154" y="2955029"/>
+            <a:ext cx="5903554" cy="369332"/>
+          </a:xfrm>
+          <a:prstGeom prst="rect">
+            <a:avLst/>
+          </a:prstGeom>
+          <a:noFill/>
+        </p:spPr>
+        <p:txBody>
+          <a:bodyPr wrap="square" rtlCol="0">
+            <a:spAutoFit/>
+          </a:bodyPr>
+          <a:lstStyle/>
+          <a:p>
+            <a:r>
+              <a:rPr lang="en-GB" dirty="0"/>
+              <a:t>MAKE APPOINTMENT</a:t>
+            </a:r>
+          </a:p>
+        </p:txBody>
+      </p:sp>
+    </p:spTree>
+    <p:extLst>
+      <p:ext uri="{BB962C8B-B14F-4D97-AF65-F5344CB8AC3E}">
+        <p14:creationId xmlns:p14="http://schemas.microsoft.com/office/powerpoint/2010/main" val="1891133919"/>
       </p:ext>
     </p:extLst>
   </p:cSld>

</xml_diff>